<commit_message>
Fixed harmless copy/paste issue
</commit_message>
<xml_diff>
--- a/slides/SER_methods_01.07.20.pptx
+++ b/slides/SER_methods_01.07.20.pptx
@@ -5,7 +5,7 @@
     <p:sldMasterId id="2147483648" r:id="rId1"/>
   </p:sldMasterIdLst>
   <p:notesMasterIdLst>
-    <p:notesMasterId r:id="rId9"/>
+    <p:notesMasterId r:id="rId10"/>
   </p:notesMasterIdLst>
   <p:sldIdLst>
     <p:sldId id="256" r:id="rId2"/>
@@ -15,6 +15,7 @@
     <p:sldId id="297" r:id="rId6"/>
     <p:sldId id="298" r:id="rId7"/>
     <p:sldId id="272" r:id="rId8"/>
+    <p:sldId id="299" r:id="rId9"/>
   </p:sldIdLst>
   <p:sldSz cx="9144000" cy="6858000" type="screen4x3"/>
   <p:notesSz cx="6858000" cy="9144000"/>
@@ -217,7 +218,7 @@
           <a:p>
             <a:fld id="{27820A56-D613-48BB-844E-EE38B2A5CFA1}" type="datetimeFigureOut">
               <a:rPr lang="en-US" smtClean="0"/>
-              <a:t>1/7/21</a:t>
+              <a:t>1/8/21</a:t>
             </a:fld>
             <a:endParaRPr lang="en-US"/>
           </a:p>
@@ -5524,8 +5525,8 @@
           </a:p>
         </p:txBody>
       </p:sp>
-      <mc:AlternateContent xmlns:mc="http://schemas.openxmlformats.org/markup-compatibility/2006">
-        <mc:Choice xmlns:a14="http://schemas.microsoft.com/office/drawing/2010/main" Requires="a14">
+      <mc:AlternateContent xmlns:mc="http://schemas.openxmlformats.org/markup-compatibility/2006" xmlns:a14="http://schemas.microsoft.com/office/drawing/2010/main">
+        <mc:Choice Requires="a14">
           <p:sp>
             <p:nvSpPr>
               <p:cNvPr id="3" name="Content Placeholder 2">
@@ -5647,14 +5648,7 @@
                                 <a:latin typeface="Cambria Math" panose="02040503050406030204" pitchFamily="18" charset="0"/>
                                 <a:cs typeface="Arial" panose="020B0604020202020204" pitchFamily="34" charset="0"/>
                               </a:rPr>
-                              <m:t>=</m:t>
-                            </m:r>
-                            <m:r>
-                              <a:rPr lang="en-US" sz="2200" i="1">
-                                <a:latin typeface="Cambria Math" panose="02040503050406030204" pitchFamily="18" charset="0"/>
-                                <a:cs typeface="Arial" panose="020B0604020202020204" pitchFamily="34" charset="0"/>
-                              </a:rPr>
-                              <m:t>1</m:t>
+                              <m:t>=1</m:t>
                             </m:r>
                           </m:e>
                         </m:d>
@@ -5732,7 +5726,7 @@
             </p:txBody>
           </p:sp>
         </mc:Choice>
-        <mc:Fallback>
+        <mc:Fallback xmlns="">
           <p:sp>
             <p:nvSpPr>
               <p:cNvPr id="3" name="Content Placeholder 2">
@@ -5806,8 +5800,8 @@
           </a:p>
         </p:txBody>
       </p:sp>
-      <mc:AlternateContent xmlns:mc="http://schemas.openxmlformats.org/markup-compatibility/2006">
-        <mc:Choice xmlns:a14="http://schemas.microsoft.com/office/drawing/2010/main" Requires="a14">
+      <mc:AlternateContent xmlns:mc="http://schemas.openxmlformats.org/markup-compatibility/2006" xmlns:a14="http://schemas.microsoft.com/office/drawing/2010/main">
+        <mc:Choice Requires="a14">
           <p:sp>
             <p:nvSpPr>
               <p:cNvPr id="6" name="TextBox 5">
@@ -6174,7 +6168,7 @@
             </p:txBody>
           </p:sp>
         </mc:Choice>
-        <mc:Fallback>
+        <mc:Fallback xmlns="">
           <p:sp>
             <p:nvSpPr>
               <p:cNvPr id="6" name="TextBox 5">
@@ -6626,13 +6620,13 @@
   <p:clrMapOvr>
     <a:masterClrMapping/>
   </p:clrMapOvr>
-  <mc:AlternateContent xmlns:mc="http://schemas.openxmlformats.org/markup-compatibility/2006">
-    <mc:Choice xmlns:p14="http://schemas.microsoft.com/office/powerpoint/2010/main" Requires="p14">
+  <mc:AlternateContent xmlns:mc="http://schemas.openxmlformats.org/markup-compatibility/2006" xmlns:p14="http://schemas.microsoft.com/office/powerpoint/2010/main">
+    <mc:Choice Requires="p14">
       <p:transition p14:dur="250">
         <p:fade/>
       </p:transition>
     </mc:Choice>
-    <mc:Fallback>
+    <mc:Fallback xmlns="">
       <p:transition>
         <p:fade/>
       </p:transition>
@@ -6813,6 +6807,73 @@
     <p:extLst>
       <p:ext uri="{BB962C8B-B14F-4D97-AF65-F5344CB8AC3E}">
         <p14:creationId xmlns:p14="http://schemas.microsoft.com/office/powerpoint/2010/main" val="1957729919"/>
+      </p:ext>
+    </p:extLst>
+  </p:cSld>
+  <p:clrMapOvr>
+    <a:masterClrMapping/>
+  </p:clrMapOvr>
+  <mc:AlternateContent xmlns:mc="http://schemas.openxmlformats.org/markup-compatibility/2006" xmlns:p14="http://schemas.microsoft.com/office/powerpoint/2010/main">
+    <mc:Choice Requires="p14">
+      <p:transition p14:dur="250">
+        <p:fade/>
+      </p:transition>
+    </mc:Choice>
+    <mc:Fallback xmlns="">
+      <p:transition>
+        <p:fade/>
+      </p:transition>
+    </mc:Fallback>
+  </mc:AlternateContent>
+</p:sld>
+</file>
+
+<file path=ppt/slides/slide8.xml><?xml version="1.0" encoding="utf-8"?>
+<p:sld xmlns:a="http://schemas.openxmlformats.org/drawingml/2006/main" xmlns:r="http://schemas.openxmlformats.org/officeDocument/2006/relationships" xmlns:p="http://schemas.openxmlformats.org/presentationml/2006/main">
+  <p:cSld>
+    <p:spTree>
+      <p:nvGrpSpPr>
+        <p:cNvPr id="1" name=""/>
+        <p:cNvGrpSpPr/>
+        <p:nvPr/>
+      </p:nvGrpSpPr>
+      <p:grpSpPr>
+        <a:xfrm>
+          <a:off x="0" y="0"/>
+          <a:ext cx="0" cy="0"/>
+          <a:chOff x="0" y="0"/>
+          <a:chExt cx="0" cy="0"/>
+        </a:xfrm>
+      </p:grpSpPr>
+      <p:sp>
+        <p:nvSpPr>
+          <p:cNvPr id="2" name="Title 1">
+            <a:extLst>
+              <a:ext uri="{FF2B5EF4-FFF2-40B4-BE49-F238E27FC236}">
+                <a16:creationId xmlns:a16="http://schemas.microsoft.com/office/drawing/2014/main" id="{F463CCB2-1806-944A-A497-94F4474C072E}"/>
+              </a:ext>
+            </a:extLst>
+          </p:cNvPr>
+          <p:cNvSpPr>
+            <a:spLocks noGrp="1"/>
+          </p:cNvSpPr>
+          <p:nvPr>
+            <p:ph type="title"/>
+          </p:nvPr>
+        </p:nvSpPr>
+        <p:spPr/>
+        <p:txBody>
+          <a:bodyPr/>
+          <a:lstStyle/>
+          <a:p>
+            <a:endParaRPr lang="en-US"/>
+          </a:p>
+        </p:txBody>
+      </p:sp>
+    </p:spTree>
+    <p:extLst>
+      <p:ext uri="{BB962C8B-B14F-4D97-AF65-F5344CB8AC3E}">
+        <p14:creationId xmlns:p14="http://schemas.microsoft.com/office/powerpoint/2010/main" val="1838397622"/>
       </p:ext>
     </p:extLst>
   </p:cSld>

</xml_diff>